<commit_message>
All JS files are now commented
</commit_message>
<xml_diff>
--- a/Project_2.pptx
+++ b/Project_2.pptx
@@ -201,7 +201,7 @@
           <a:p>
             <a:fld id="{D787FA33-36A0-4BA6-AA24-14202E5CC49F}" type="datetimeFigureOut">
               <a:rPr lang="en-US" smtClean="0"/>
-              <a:t>9/14/2020</a:t>
+              <a:t>9/17/2020</a:t>
             </a:fld>
             <a:endParaRPr lang="en-US"/>
           </a:p>
@@ -1035,7 +1035,7 @@
           <a:p>
             <a:fld id="{76390919-E38A-43AC-80A0-C781043285AC}" type="datetimeFigureOut">
               <a:rPr lang="en-US" smtClean="0"/>
-              <a:t>9/14/2020</a:t>
+              <a:t>9/17/2020</a:t>
             </a:fld>
             <a:endParaRPr lang="en-US"/>
           </a:p>
@@ -1233,7 +1233,7 @@
           <a:p>
             <a:fld id="{76390919-E38A-43AC-80A0-C781043285AC}" type="datetimeFigureOut">
               <a:rPr lang="en-US" smtClean="0"/>
-              <a:t>9/14/2020</a:t>
+              <a:t>9/17/2020</a:t>
             </a:fld>
             <a:endParaRPr lang="en-US"/>
           </a:p>
@@ -1441,7 +1441,7 @@
           <a:p>
             <a:fld id="{76390919-E38A-43AC-80A0-C781043285AC}" type="datetimeFigureOut">
               <a:rPr lang="en-US" smtClean="0"/>
-              <a:t>9/14/2020</a:t>
+              <a:t>9/17/2020</a:t>
             </a:fld>
             <a:endParaRPr lang="en-US"/>
           </a:p>
@@ -1639,7 +1639,7 @@
           <a:p>
             <a:fld id="{76390919-E38A-43AC-80A0-C781043285AC}" type="datetimeFigureOut">
               <a:rPr lang="en-US" smtClean="0"/>
-              <a:t>9/14/2020</a:t>
+              <a:t>9/17/2020</a:t>
             </a:fld>
             <a:endParaRPr lang="en-US"/>
           </a:p>
@@ -1914,7 +1914,7 @@
           <a:p>
             <a:fld id="{76390919-E38A-43AC-80A0-C781043285AC}" type="datetimeFigureOut">
               <a:rPr lang="en-US" smtClean="0"/>
-              <a:t>9/14/2020</a:t>
+              <a:t>9/17/2020</a:t>
             </a:fld>
             <a:endParaRPr lang="en-US"/>
           </a:p>
@@ -2179,7 +2179,7 @@
           <a:p>
             <a:fld id="{76390919-E38A-43AC-80A0-C781043285AC}" type="datetimeFigureOut">
               <a:rPr lang="en-US" smtClean="0"/>
-              <a:t>9/14/2020</a:t>
+              <a:t>9/17/2020</a:t>
             </a:fld>
             <a:endParaRPr lang="en-US"/>
           </a:p>
@@ -2591,7 +2591,7 @@
           <a:p>
             <a:fld id="{76390919-E38A-43AC-80A0-C781043285AC}" type="datetimeFigureOut">
               <a:rPr lang="en-US" smtClean="0"/>
-              <a:t>9/14/2020</a:t>
+              <a:t>9/17/2020</a:t>
             </a:fld>
             <a:endParaRPr lang="en-US"/>
           </a:p>
@@ -2732,7 +2732,7 @@
           <a:p>
             <a:fld id="{76390919-E38A-43AC-80A0-C781043285AC}" type="datetimeFigureOut">
               <a:rPr lang="en-US" smtClean="0"/>
-              <a:t>9/14/2020</a:t>
+              <a:t>9/17/2020</a:t>
             </a:fld>
             <a:endParaRPr lang="en-US"/>
           </a:p>
@@ -2845,7 +2845,7 @@
           <a:p>
             <a:fld id="{76390919-E38A-43AC-80A0-C781043285AC}" type="datetimeFigureOut">
               <a:rPr lang="en-US" smtClean="0"/>
-              <a:t>9/14/2020</a:t>
+              <a:t>9/17/2020</a:t>
             </a:fld>
             <a:endParaRPr lang="en-US"/>
           </a:p>
@@ -3156,7 +3156,7 @@
           <a:p>
             <a:fld id="{76390919-E38A-43AC-80A0-C781043285AC}" type="datetimeFigureOut">
               <a:rPr lang="en-US" smtClean="0"/>
-              <a:t>9/14/2020</a:t>
+              <a:t>9/17/2020</a:t>
             </a:fld>
             <a:endParaRPr lang="en-US"/>
           </a:p>
@@ -3444,7 +3444,7 @@
           <a:p>
             <a:fld id="{76390919-E38A-43AC-80A0-C781043285AC}" type="datetimeFigureOut">
               <a:rPr lang="en-US" smtClean="0"/>
-              <a:t>9/14/2020</a:t>
+              <a:t>9/17/2020</a:t>
             </a:fld>
             <a:endParaRPr lang="en-US"/>
           </a:p>
@@ -3685,7 +3685,7 @@
           <a:p>
             <a:fld id="{76390919-E38A-43AC-80A0-C781043285AC}" type="datetimeFigureOut">
               <a:rPr lang="en-US" smtClean="0"/>
-              <a:t>9/14/2020</a:t>
+              <a:t>9/17/2020</a:t>
             </a:fld>
             <a:endParaRPr lang="en-US"/>
           </a:p>
@@ -6751,7 +6751,7 @@
                 <a:latin typeface="Lucida Sans Unicode" panose="020B0602030504020204" pitchFamily="34" charset="0"/>
                 <a:cs typeface="Lucida Sans Unicode" panose="020B0602030504020204" pitchFamily="34" charset="0"/>
               </a:rPr>
-              <a:t>The West coast has significantly higher counts of fires than the East cost which could be a result of drought in certain areas</a:t>
+              <a:t>The West coast has significantly higher counts of fires than the East coast which could be a result of drought in certain areas</a:t>
             </a:r>
           </a:p>
           <a:p>

</xml_diff>